<commit_message>
add a ETE tree to the goal slide, move the details to the detailed goal slide
</commit_message>
<xml_diff>
--- a/Presentation/Taxonomy-specific RPS-BLAST.pptx
+++ b/Presentation/Taxonomy-specific RPS-BLAST.pptx
@@ -7,12 +7,13 @@
   <p:sldIdLst>
     <p:sldId id="256" r:id="rId2"/>
     <p:sldId id="257" r:id="rId3"/>
-    <p:sldId id="259" r:id="rId4"/>
-    <p:sldId id="263" r:id="rId5"/>
-    <p:sldId id="262" r:id="rId6"/>
-    <p:sldId id="260" r:id="rId7"/>
-    <p:sldId id="261" r:id="rId8"/>
-    <p:sldId id="258" r:id="rId9"/>
+    <p:sldId id="264" r:id="rId4"/>
+    <p:sldId id="259" r:id="rId5"/>
+    <p:sldId id="263" r:id="rId6"/>
+    <p:sldId id="262" r:id="rId7"/>
+    <p:sldId id="260" r:id="rId8"/>
+    <p:sldId id="261" r:id="rId9"/>
+    <p:sldId id="258" r:id="rId10"/>
   </p:sldIdLst>
   <p:sldSz cx="12192000" cy="6858000"/>
   <p:notesSz cx="6858000" cy="9144000"/>
@@ -3596,37 +3597,41 @@
           <a:p>
             <a:r>
               <a:rPr lang="en-US" dirty="0"/>
-              <a:t>To assign taxonomy information for a given protein model</a:t>
-            </a:r>
-          </a:p>
-          <a:p>
-            <a:r>
-              <a:rPr lang="en-US" dirty="0"/>
-              <a:t>Use case: CDD database</a:t>
-            </a:r>
-          </a:p>
-          <a:p>
-            <a:pPr lvl="1"/>
-            <a:r>
-              <a:rPr lang="en-US" dirty="0">
-                <a:sym typeface="Wingdings" panose="05000000000000000000" pitchFamily="2" charset="2"/>
-              </a:rPr>
-              <a:t>For each model  </a:t>
-            </a:r>
-            <a:r>
-              <a:rPr lang="en-US" dirty="0"/>
-              <a:t>identify the lowest common taxonomic node -&gt; assign it a taxonomy ID</a:t>
-            </a:r>
-          </a:p>
-          <a:p>
-            <a:pPr lvl="1"/>
-            <a:r>
-              <a:rPr lang="en-US" dirty="0"/>
-              <a:t>Use taxonomy information to limit an RPS-BLAST search</a:t>
-            </a:r>
-          </a:p>
-        </p:txBody>
-      </p:sp>
+              <a:t>To assign taxonomy information to conserved protein domains</a:t>
+            </a:r>
+          </a:p>
+        </p:txBody>
+      </p:sp>
+      <p:pic>
+        <p:nvPicPr>
+          <p:cNvPr id="6" name="Picture 5">
+            <a:extLst>
+              <a:ext uri="{FF2B5EF4-FFF2-40B4-BE49-F238E27FC236}">
+                <a16:creationId xmlns:a16="http://schemas.microsoft.com/office/drawing/2014/main" id="{74D48126-ED2E-4FF4-AE19-5FD1855FF207}"/>
+              </a:ext>
+            </a:extLst>
+          </p:cNvPr>
+          <p:cNvPicPr>
+            <a:picLocks noChangeAspect="1"/>
+          </p:cNvPicPr>
+          <p:nvPr/>
+        </p:nvPicPr>
+        <p:blipFill>
+          <a:blip r:embed="rId2"/>
+          <a:stretch>
+            <a:fillRect/>
+          </a:stretch>
+        </p:blipFill>
+        <p:spPr>
+          <a:xfrm>
+            <a:off x="2952750" y="2423757"/>
+            <a:ext cx="6286500" cy="3952875"/>
+          </a:xfrm>
+          <a:prstGeom prst="rect">
+            <a:avLst/>
+          </a:prstGeom>
+        </p:spPr>
+      </p:pic>
     </p:spTree>
     <p:extLst>
       <p:ext uri="{BB962C8B-B14F-4D97-AF65-F5344CB8AC3E}">
@@ -3641,6 +3646,126 @@
 </file>
 
 <file path=ppt/slides/slide3.xml><?xml version="1.0" encoding="utf-8"?>
+<p:sld xmlns:a="http://schemas.openxmlformats.org/drawingml/2006/main" xmlns:r="http://schemas.openxmlformats.org/officeDocument/2006/relationships" xmlns:p="http://schemas.openxmlformats.org/presentationml/2006/main">
+  <p:cSld>
+    <p:spTree>
+      <p:nvGrpSpPr>
+        <p:cNvPr id="1" name=""/>
+        <p:cNvGrpSpPr/>
+        <p:nvPr/>
+      </p:nvGrpSpPr>
+      <p:grpSpPr>
+        <a:xfrm>
+          <a:off x="0" y="0"/>
+          <a:ext cx="0" cy="0"/>
+          <a:chOff x="0" y="0"/>
+          <a:chExt cx="0" cy="0"/>
+        </a:xfrm>
+      </p:grpSpPr>
+      <p:sp>
+        <p:nvSpPr>
+          <p:cNvPr id="2" name="Title 1">
+            <a:extLst>
+              <a:ext uri="{FF2B5EF4-FFF2-40B4-BE49-F238E27FC236}">
+                <a16:creationId xmlns:a16="http://schemas.microsoft.com/office/drawing/2014/main" id="{C06BC47A-2E2D-4ADD-BF56-A3787ED286F4}"/>
+              </a:ext>
+            </a:extLst>
+          </p:cNvPr>
+          <p:cNvSpPr>
+            <a:spLocks noGrp="1"/>
+          </p:cNvSpPr>
+          <p:nvPr>
+            <p:ph type="title"/>
+          </p:nvPr>
+        </p:nvSpPr>
+        <p:spPr/>
+        <p:txBody>
+          <a:bodyPr/>
+          <a:lstStyle/>
+          <a:p>
+            <a:r>
+              <a:rPr lang="en-US" dirty="0"/>
+              <a:t>Detailed Goal</a:t>
+            </a:r>
+          </a:p>
+        </p:txBody>
+      </p:sp>
+      <p:sp>
+        <p:nvSpPr>
+          <p:cNvPr id="3" name="Content Placeholder 2">
+            <a:extLst>
+              <a:ext uri="{FF2B5EF4-FFF2-40B4-BE49-F238E27FC236}">
+                <a16:creationId xmlns:a16="http://schemas.microsoft.com/office/drawing/2014/main" id="{E4046003-CABC-4C4C-95F1-723934D53333}"/>
+              </a:ext>
+            </a:extLst>
+          </p:cNvPr>
+          <p:cNvSpPr>
+            <a:spLocks noGrp="1"/>
+          </p:cNvSpPr>
+          <p:nvPr>
+            <p:ph idx="1"/>
+          </p:nvPr>
+        </p:nvSpPr>
+        <p:spPr/>
+        <p:txBody>
+          <a:bodyPr/>
+          <a:lstStyle/>
+          <a:p>
+            <a:r>
+              <a:rPr lang="en-US">
+                <a:sym typeface="Wingdings" panose="05000000000000000000" pitchFamily="2" charset="2"/>
+              </a:rPr>
+              <a:t>conserved domain  model </a:t>
+            </a:r>
+            <a:r>
+              <a:rPr lang="en-US" dirty="0">
+                <a:sym typeface="Wingdings" panose="05000000000000000000" pitchFamily="2" charset="2"/>
+              </a:rPr>
+              <a:t> </a:t>
+            </a:r>
+            <a:r>
+              <a:rPr lang="en-US" dirty="0"/>
+              <a:t>the lowest common taxonomic node </a:t>
+            </a:r>
+            <a:r>
+              <a:rPr lang="en-US" dirty="0">
+                <a:sym typeface="Wingdings" panose="05000000000000000000" pitchFamily="2" charset="2"/>
+              </a:rPr>
+              <a:t></a:t>
+            </a:r>
+            <a:r>
+              <a:rPr lang="en-US" dirty="0"/>
+              <a:t> taxonomy ID</a:t>
+            </a:r>
+          </a:p>
+          <a:p>
+            <a:r>
+              <a:rPr lang="en-US" dirty="0"/>
+              <a:t>Use taxonomy information to limit an RPS-BLAST search</a:t>
+            </a:r>
+          </a:p>
+          <a:p>
+            <a:pPr marL="0" indent="0">
+              <a:buNone/>
+            </a:pPr>
+            <a:endParaRPr lang="en-US" dirty="0"/>
+          </a:p>
+        </p:txBody>
+      </p:sp>
+    </p:spTree>
+    <p:extLst>
+      <p:ext uri="{BB962C8B-B14F-4D97-AF65-F5344CB8AC3E}">
+        <p14:creationId xmlns:p14="http://schemas.microsoft.com/office/powerpoint/2010/main" val="3881621812"/>
+      </p:ext>
+    </p:extLst>
+  </p:cSld>
+  <p:clrMapOvr>
+    <a:masterClrMapping/>
+  </p:clrMapOvr>
+</p:sld>
+</file>
+
+<file path=ppt/slides/slide4.xml><?xml version="1.0" encoding="utf-8"?>
 <p:sld xmlns:a="http://schemas.openxmlformats.org/drawingml/2006/main" xmlns:r="http://schemas.openxmlformats.org/officeDocument/2006/relationships" xmlns:p="http://schemas.openxmlformats.org/presentationml/2006/main">
   <p:cSld>
     <p:spTree>
@@ -4364,7 +4489,7 @@
 </p:sld>
 </file>
 
-<file path=ppt/slides/slide4.xml><?xml version="1.0" encoding="utf-8"?>
+<file path=ppt/slides/slide5.xml><?xml version="1.0" encoding="utf-8"?>
 <p:sld xmlns:a="http://schemas.openxmlformats.org/drawingml/2006/main" xmlns:r="http://schemas.openxmlformats.org/officeDocument/2006/relationships" xmlns:p="http://schemas.openxmlformats.org/presentationml/2006/main">
   <p:cSld>
     <p:spTree>
@@ -6305,7 +6430,7 @@
 </p:sld>
 </file>
 
-<file path=ppt/slides/slide5.xml><?xml version="1.0" encoding="utf-8"?>
+<file path=ppt/slides/slide6.xml><?xml version="1.0" encoding="utf-8"?>
 <p:sld xmlns:a="http://schemas.openxmlformats.org/drawingml/2006/main" xmlns:r="http://schemas.openxmlformats.org/officeDocument/2006/relationships" xmlns:p="http://schemas.openxmlformats.org/presentationml/2006/main">
   <p:cSld>
     <p:spTree>
@@ -6429,7 +6554,7 @@
 </p:sld>
 </file>
 
-<file path=ppt/slides/slide6.xml><?xml version="1.0" encoding="utf-8"?>
+<file path=ppt/slides/slide7.xml><?xml version="1.0" encoding="utf-8"?>
 <p:sld xmlns:a="http://schemas.openxmlformats.org/drawingml/2006/main" xmlns:r="http://schemas.openxmlformats.org/officeDocument/2006/relationships" xmlns:p="http://schemas.openxmlformats.org/presentationml/2006/main">
   <p:cSld>
     <p:spTree>
@@ -7337,7 +7462,7 @@
 </p:sld>
 </file>
 
-<file path=ppt/slides/slide7.xml><?xml version="1.0" encoding="utf-8"?>
+<file path=ppt/slides/slide8.xml><?xml version="1.0" encoding="utf-8"?>
 <p:sld xmlns:a="http://schemas.openxmlformats.org/drawingml/2006/main" xmlns:r="http://schemas.openxmlformats.org/officeDocument/2006/relationships" xmlns:p="http://schemas.openxmlformats.org/presentationml/2006/main">
   <p:cSld>
     <p:spTree>
@@ -7442,7 +7567,7 @@
           <a:noFill/>
           <a:extLst>
             <a:ext uri="{909E8E84-426E-40dd-AFC4-6F175D3DCCD1}">
-              <a14:hiddenFill xmlns:a14="http://schemas.microsoft.com/office/drawing/2010/main" xmlns="">
+              <a14:hiddenFill xmlns="" xmlns:a14="http://schemas.microsoft.com/office/drawing/2010/main">
                 <a:solidFill>
                   <a:srgbClr val="FFFFFF"/>
                 </a:solidFill>
@@ -7464,7 +7589,7 @@
 </p:sld>
 </file>
 
-<file path=ppt/slides/slide8.xml><?xml version="1.0" encoding="utf-8"?>
+<file path=ppt/slides/slide9.xml><?xml version="1.0" encoding="utf-8"?>
 <p:sld xmlns:a="http://schemas.openxmlformats.org/drawingml/2006/main" xmlns:r="http://schemas.openxmlformats.org/officeDocument/2006/relationships" xmlns:p="http://schemas.openxmlformats.org/presentationml/2006/main">
   <p:cSld>
     <p:spTree>

</xml_diff>

<commit_message>
add the name for pssm-id: 200311 in case someone is curious
</commit_message>
<xml_diff>
--- a/Presentation/Taxonomy-specific RPS-BLAST.pptx
+++ b/Presentation/Taxonomy-specific RPS-BLAST.pptx
@@ -6476,7 +6476,7 @@
           <a:noFill/>
           <a:extLst>
             <a:ext uri="{909E8E84-426E-40dd-AFC4-6F175D3DCCD1}">
-              <a14:hiddenFill xmlns="" xmlns:a14="http://schemas.microsoft.com/office/drawing/2010/main">
+              <a14:hiddenFill xmlns:a14="http://schemas.microsoft.com/office/drawing/2010/main" xmlns="">
                 <a:solidFill>
                   <a:srgbClr val="FFFFFF"/>
                 </a:solidFill>
@@ -7603,7 +7603,7 @@
         <p:spPr>
           <a:xfrm>
             <a:off x="658585" y="1737440"/>
-            <a:ext cx="2305439" cy="461665"/>
+            <a:ext cx="4432817" cy="461665"/>
           </a:xfrm>
           <a:prstGeom prst="rect">
             <a:avLst/>
@@ -7618,8 +7618,13 @@
           <a:p>
             <a:r>
               <a:rPr lang="en-US" sz="2400" dirty="0"/>
-              <a:t>PSSM-Id: 200311</a:t>
-            </a:r>
+              <a:t>PSSM-Id: 200311, </a:t>
+            </a:r>
+            <a:r>
+              <a:rPr lang="en-US" sz="2400" dirty="0" err="1"/>
+              <a:t>pupylate_cterm</a:t>
+            </a:r>
+            <a:endParaRPr lang="en-US" sz="2400" dirty="0"/>
           </a:p>
         </p:txBody>
       </p:sp>

</xml_diff>